<commit_message>
Add : percy, mochawsomereport
</commit_message>
<xml_diff>
--- a/presentation/presentation.pptx
+++ b/presentation/presentation.pptx
@@ -8,8 +8,10 @@
     <p:sldId id="256" r:id="rId2"/>
     <p:sldId id="257" r:id="rId3"/>
     <p:sldId id="259" r:id="rId4"/>
-    <p:sldId id="258" r:id="rId5"/>
+    <p:sldId id="261" r:id="rId5"/>
     <p:sldId id="260" r:id="rId6"/>
+    <p:sldId id="262" r:id="rId7"/>
+    <p:sldId id="258" r:id="rId8"/>
   </p:sldIdLst>
   <p:sldSz cx="12192000" cy="6858000"/>
   <p:notesSz cx="6858000" cy="9144000"/>
@@ -8306,8 +8308,13 @@
           <a:p>
             <a:r>
               <a:rPr lang="fr-FR" dirty="0"/>
-              <a:t>Titre</a:t>
+              <a:t>The cat </a:t>
             </a:r>
+            <a:r>
+              <a:rPr lang="fr-FR" dirty="0" err="1"/>
+              <a:t>lovers</a:t>
+            </a:r>
+            <a:endParaRPr lang="fr-FR" dirty="0"/>
           </a:p>
         </p:txBody>
       </p:sp>
@@ -8382,11 +8389,17 @@
             <p:ph type="title"/>
           </p:nvPr>
         </p:nvSpPr>
-        <p:spPr/>
+        <p:spPr>
+          <a:xfrm>
+            <a:off x="0" y="18884"/>
+            <a:ext cx="12192000" cy="3117040"/>
+          </a:xfrm>
+        </p:spPr>
         <p:txBody>
           <a:bodyPr/>
           <a:lstStyle/>
           <a:p>
+            <a:pPr algn="ctr"/>
             <a:r>
               <a:rPr lang="fr-FR" dirty="0"/>
               <a:t>Présentation de l’équipe</a:t>
@@ -8394,27 +8407,1237 @@
           </a:p>
         </p:txBody>
       </p:sp>
-      <p:sp>
-        <p:nvSpPr>
-          <p:cNvPr id="5" name="Espace réservé du texte 4">
+      <p:grpSp>
+        <p:nvGrpSpPr>
+          <p:cNvPr id="9" name="Groupe 8">
             <a:extLst>
               <a:ext uri="{FF2B5EF4-FFF2-40B4-BE49-F238E27FC236}">
-                <a16:creationId xmlns:a16="http://schemas.microsoft.com/office/drawing/2014/main" id="{9F7138DB-7850-D117-D848-969EF6A0AAF0}"/>
+                <a16:creationId xmlns:a16="http://schemas.microsoft.com/office/drawing/2014/main" id="{F9EFDDCD-9232-8FC3-FF44-47EB4CAF59D5}"/>
               </a:ext>
             </a:extLst>
           </p:cNvPr>
-          <p:cNvSpPr>
-            <a:spLocks noGrp="1"/>
-          </p:cNvSpPr>
-          <p:nvPr>
-            <p:ph type="body" idx="1"/>
-          </p:nvPr>
-        </p:nvSpPr>
-        <p:spPr/>
-        <p:txBody>
-          <a:bodyPr/>
+          <p:cNvGrpSpPr/>
+          <p:nvPr/>
+        </p:nvGrpSpPr>
+        <p:grpSpPr>
+          <a:xfrm>
+            <a:off x="2297889" y="3722077"/>
+            <a:ext cx="1413906" cy="2398334"/>
+            <a:chOff x="246451" y="1143404"/>
+            <a:chExt cx="1413906" cy="1397494"/>
+          </a:xfrm>
+        </p:grpSpPr>
+        <p:sp>
+          <p:nvSpPr>
+            <p:cNvPr id="10" name="Rectangle : avec coins arrondis en haut 9">
+              <a:extLst>
+                <a:ext uri="{FF2B5EF4-FFF2-40B4-BE49-F238E27FC236}">
+                  <a16:creationId xmlns:a16="http://schemas.microsoft.com/office/drawing/2014/main" id="{5EF5F8B8-8A59-B9AB-B9D2-075F91BBF860}"/>
+                </a:ext>
+              </a:extLst>
+            </p:cNvPr>
+            <p:cNvSpPr/>
+            <p:nvPr/>
+          </p:nvSpPr>
+          <p:spPr>
+            <a:xfrm rot="10800000">
+              <a:off x="246451" y="1143404"/>
+              <a:ext cx="1413906" cy="1397494"/>
+            </a:xfrm>
+            <a:prstGeom prst="round2SameRect">
+              <a:avLst>
+                <a:gd name="adj1" fmla="val 10500"/>
+                <a:gd name="adj2" fmla="val 0"/>
+              </a:avLst>
+            </a:prstGeom>
+          </p:spPr>
+          <p:style>
+            <a:lnRef idx="2">
+              <a:schemeClr val="lt1">
+                <a:hueOff val="0"/>
+                <a:satOff val="0"/>
+                <a:lumOff val="0"/>
+                <a:alphaOff val="0"/>
+              </a:schemeClr>
+            </a:lnRef>
+            <a:fillRef idx="1">
+              <a:schemeClr val="accent2">
+                <a:hueOff val="0"/>
+                <a:satOff val="0"/>
+                <a:lumOff val="0"/>
+                <a:alphaOff val="0"/>
+              </a:schemeClr>
+            </a:fillRef>
+            <a:effectRef idx="0">
+              <a:schemeClr val="accent2">
+                <a:hueOff val="0"/>
+                <a:satOff val="0"/>
+                <a:lumOff val="0"/>
+                <a:alphaOff val="0"/>
+              </a:schemeClr>
+            </a:effectRef>
+            <a:fontRef idx="minor">
+              <a:schemeClr val="lt1"/>
+            </a:fontRef>
+          </p:style>
+        </p:sp>
+        <p:sp>
+          <p:nvSpPr>
+            <p:cNvPr id="11" name="Rectangle : avec coins arrondis en haut 4">
+              <a:extLst>
+                <a:ext uri="{FF2B5EF4-FFF2-40B4-BE49-F238E27FC236}">
+                  <a16:creationId xmlns:a16="http://schemas.microsoft.com/office/drawing/2014/main" id="{9BB1AE98-D30E-0FB8-A165-4397F8EF5236}"/>
+                </a:ext>
+              </a:extLst>
+            </p:cNvPr>
+            <p:cNvSpPr txBox="1"/>
+            <p:nvPr/>
+          </p:nvSpPr>
+          <p:spPr>
+            <a:xfrm>
+              <a:off x="289429" y="1143404"/>
+              <a:ext cx="1327950" cy="1354516"/>
+            </a:xfrm>
+            <a:prstGeom prst="rect">
+              <a:avLst/>
+            </a:prstGeom>
+          </p:spPr>
+          <p:style>
+            <a:lnRef idx="0">
+              <a:scrgbClr r="0" g="0" b="0"/>
+            </a:lnRef>
+            <a:fillRef idx="0">
+              <a:scrgbClr r="0" g="0" b="0"/>
+            </a:fillRef>
+            <a:effectRef idx="0">
+              <a:scrgbClr r="0" g="0" b="0"/>
+            </a:effectRef>
+            <a:fontRef idx="minor">
+              <a:schemeClr val="lt1"/>
+            </a:fontRef>
+          </p:style>
+          <p:txBody>
+            <a:bodyPr spcFirstLastPara="0" vert="horz" wrap="square" lIns="135128" tIns="135128" rIns="135128" bIns="135128" numCol="1" spcCol="1270" anchor="t" anchorCtr="0">
+              <a:noAutofit/>
+            </a:bodyPr>
+            <a:lstStyle/>
+            <a:p>
+              <a:pPr marL="0" lvl="0" indent="0" algn="ctr" defTabSz="844550">
+                <a:lnSpc>
+                  <a:spcPct val="90000"/>
+                </a:lnSpc>
+                <a:spcBef>
+                  <a:spcPct val="0"/>
+                </a:spcBef>
+                <a:spcAft>
+                  <a:spcPct val="35000"/>
+                </a:spcAft>
+                <a:buNone/>
+              </a:pPr>
+              <a:endParaRPr lang="fr-FR" sz="1900" kern="1200" dirty="0"/>
+            </a:p>
+            <a:p>
+              <a:pPr marL="0" lvl="0" indent="0" algn="ctr" defTabSz="844550">
+                <a:lnSpc>
+                  <a:spcPct val="90000"/>
+                </a:lnSpc>
+                <a:spcBef>
+                  <a:spcPct val="0"/>
+                </a:spcBef>
+                <a:spcAft>
+                  <a:spcPct val="35000"/>
+                </a:spcAft>
+                <a:buNone/>
+              </a:pPr>
+              <a:endParaRPr lang="fr-FR" sz="1900" kern="1200" dirty="0"/>
+            </a:p>
+            <a:p>
+              <a:pPr marL="0" lvl="0" indent="0" algn="ctr" defTabSz="844550">
+                <a:lnSpc>
+                  <a:spcPct val="90000"/>
+                </a:lnSpc>
+                <a:spcBef>
+                  <a:spcPct val="0"/>
+                </a:spcBef>
+                <a:spcAft>
+                  <a:spcPct val="35000"/>
+                </a:spcAft>
+                <a:buNone/>
+              </a:pPr>
+              <a:endParaRPr lang="fr-FR" sz="1900" dirty="0"/>
+            </a:p>
+            <a:p>
+              <a:pPr marL="0" lvl="0" indent="0" algn="ctr" defTabSz="844550">
+                <a:lnSpc>
+                  <a:spcPct val="90000"/>
+                </a:lnSpc>
+                <a:spcBef>
+                  <a:spcPct val="0"/>
+                </a:spcBef>
+                <a:spcAft>
+                  <a:spcPct val="35000"/>
+                </a:spcAft>
+                <a:buNone/>
+              </a:pPr>
+              <a:r>
+                <a:rPr lang="fr-FR" sz="1900" kern="1200" dirty="0"/>
+                <a:t>Alicia LACÔTE</a:t>
+              </a:r>
+            </a:p>
+          </p:txBody>
+        </p:sp>
+      </p:grpSp>
+      <p:grpSp>
+        <p:nvGrpSpPr>
+          <p:cNvPr id="12" name="Groupe 11">
+            <a:extLst>
+              <a:ext uri="{FF2B5EF4-FFF2-40B4-BE49-F238E27FC236}">
+                <a16:creationId xmlns:a16="http://schemas.microsoft.com/office/drawing/2014/main" id="{3E06BC52-DDE3-E3A6-6489-35D2FC8CABA4}"/>
+              </a:ext>
+            </a:extLst>
+          </p:cNvPr>
+          <p:cNvGrpSpPr/>
+          <p:nvPr/>
+        </p:nvGrpSpPr>
+        <p:grpSpPr>
+          <a:xfrm>
+            <a:off x="3843468" y="3722077"/>
+            <a:ext cx="1413906" cy="2398334"/>
+            <a:chOff x="1801749" y="1143404"/>
+            <a:chExt cx="1413906" cy="1397494"/>
+          </a:xfrm>
+        </p:grpSpPr>
+        <p:sp>
+          <p:nvSpPr>
+            <p:cNvPr id="13" name="Rectangle : avec coins arrondis en haut 12">
+              <a:extLst>
+                <a:ext uri="{FF2B5EF4-FFF2-40B4-BE49-F238E27FC236}">
+                  <a16:creationId xmlns:a16="http://schemas.microsoft.com/office/drawing/2014/main" id="{CD39657A-00B8-F6B2-518D-EFDE0F2C23C4}"/>
+                </a:ext>
+              </a:extLst>
+            </p:cNvPr>
+            <p:cNvSpPr/>
+            <p:nvPr/>
+          </p:nvSpPr>
+          <p:spPr>
+            <a:xfrm rot="10800000">
+              <a:off x="1801749" y="1143404"/>
+              <a:ext cx="1413906" cy="1397494"/>
+            </a:xfrm>
+            <a:prstGeom prst="round2SameRect">
+              <a:avLst>
+                <a:gd name="adj1" fmla="val 10500"/>
+                <a:gd name="adj2" fmla="val 0"/>
+              </a:avLst>
+            </a:prstGeom>
+          </p:spPr>
+          <p:style>
+            <a:lnRef idx="2">
+              <a:schemeClr val="lt1">
+                <a:hueOff val="0"/>
+                <a:satOff val="0"/>
+                <a:lumOff val="0"/>
+                <a:alphaOff val="0"/>
+              </a:schemeClr>
+            </a:lnRef>
+            <a:fillRef idx="1">
+              <a:schemeClr val="accent2">
+                <a:hueOff val="-639735"/>
+                <a:satOff val="-7212"/>
+                <a:lumOff val="883"/>
+                <a:alphaOff val="0"/>
+              </a:schemeClr>
+            </a:fillRef>
+            <a:effectRef idx="0">
+              <a:schemeClr val="accent2">
+                <a:hueOff val="-639735"/>
+                <a:satOff val="-7212"/>
+                <a:lumOff val="883"/>
+                <a:alphaOff val="0"/>
+              </a:schemeClr>
+            </a:effectRef>
+            <a:fontRef idx="minor">
+              <a:schemeClr val="lt1"/>
+            </a:fontRef>
+          </p:style>
+        </p:sp>
+        <p:sp>
+          <p:nvSpPr>
+            <p:cNvPr id="14" name="Rectangle : avec coins arrondis en haut 4">
+              <a:extLst>
+                <a:ext uri="{FF2B5EF4-FFF2-40B4-BE49-F238E27FC236}">
+                  <a16:creationId xmlns:a16="http://schemas.microsoft.com/office/drawing/2014/main" id="{673EC77F-CB35-183B-FB00-6417F5A0EBF1}"/>
+                </a:ext>
+              </a:extLst>
+            </p:cNvPr>
+            <p:cNvSpPr txBox="1"/>
+            <p:nvPr/>
+          </p:nvSpPr>
+          <p:spPr>
+            <a:xfrm rot="21600000">
+              <a:off x="1844727" y="1143404"/>
+              <a:ext cx="1327950" cy="1354516"/>
+            </a:xfrm>
+            <a:prstGeom prst="rect">
+              <a:avLst/>
+            </a:prstGeom>
+          </p:spPr>
+          <p:style>
+            <a:lnRef idx="0">
+              <a:scrgbClr r="0" g="0" b="0"/>
+            </a:lnRef>
+            <a:fillRef idx="0">
+              <a:scrgbClr r="0" g="0" b="0"/>
+            </a:fillRef>
+            <a:effectRef idx="0">
+              <a:scrgbClr r="0" g="0" b="0"/>
+            </a:effectRef>
+            <a:fontRef idx="minor">
+              <a:schemeClr val="lt1"/>
+            </a:fontRef>
+          </p:style>
+          <p:txBody>
+            <a:bodyPr spcFirstLastPara="0" vert="horz" wrap="square" lIns="135128" tIns="135128" rIns="135128" bIns="135128" numCol="1" spcCol="1270" anchor="t" anchorCtr="0">
+              <a:noAutofit/>
+            </a:bodyPr>
+            <a:lstStyle/>
+            <a:p>
+              <a:pPr marL="0" lvl="0" indent="0" algn="ctr" defTabSz="844550">
+                <a:lnSpc>
+                  <a:spcPct val="90000"/>
+                </a:lnSpc>
+                <a:spcBef>
+                  <a:spcPct val="0"/>
+                </a:spcBef>
+                <a:spcAft>
+                  <a:spcPct val="35000"/>
+                </a:spcAft>
+                <a:buNone/>
+              </a:pPr>
+              <a:endParaRPr lang="fr-FR" sz="1900" kern="1200" dirty="0"/>
+            </a:p>
+            <a:p>
+              <a:pPr marL="0" lvl="0" indent="0" algn="ctr" defTabSz="844550">
+                <a:lnSpc>
+                  <a:spcPct val="90000"/>
+                </a:lnSpc>
+                <a:spcBef>
+                  <a:spcPct val="0"/>
+                </a:spcBef>
+                <a:spcAft>
+                  <a:spcPct val="35000"/>
+                </a:spcAft>
+                <a:buNone/>
+              </a:pPr>
+              <a:endParaRPr lang="fr-FR" sz="1900" dirty="0"/>
+            </a:p>
+            <a:p>
+              <a:pPr marL="0" lvl="0" indent="0" algn="ctr" defTabSz="844550">
+                <a:lnSpc>
+                  <a:spcPct val="90000"/>
+                </a:lnSpc>
+                <a:spcBef>
+                  <a:spcPct val="0"/>
+                </a:spcBef>
+                <a:spcAft>
+                  <a:spcPct val="35000"/>
+                </a:spcAft>
+                <a:buNone/>
+              </a:pPr>
+              <a:endParaRPr lang="fr-FR" sz="1900" kern="1200" dirty="0"/>
+            </a:p>
+            <a:p>
+              <a:pPr marL="0" lvl="0" indent="0" algn="ctr" defTabSz="844550">
+                <a:lnSpc>
+                  <a:spcPct val="90000"/>
+                </a:lnSpc>
+                <a:spcBef>
+                  <a:spcPct val="0"/>
+                </a:spcBef>
+                <a:spcAft>
+                  <a:spcPct val="35000"/>
+                </a:spcAft>
+                <a:buNone/>
+              </a:pPr>
+              <a:r>
+                <a:rPr lang="fr-FR" sz="1900" kern="1200" dirty="0" err="1"/>
+                <a:t>Sona</a:t>
+              </a:r>
+              <a:endParaRPr lang="fr-FR" sz="1900" kern="1200" dirty="0"/>
+            </a:p>
+          </p:txBody>
+        </p:sp>
+      </p:grpSp>
+      <p:grpSp>
+        <p:nvGrpSpPr>
+          <p:cNvPr id="15" name="Groupe 14">
+            <a:extLst>
+              <a:ext uri="{FF2B5EF4-FFF2-40B4-BE49-F238E27FC236}">
+                <a16:creationId xmlns:a16="http://schemas.microsoft.com/office/drawing/2014/main" id="{4CDD04A5-A3D8-D637-5EDA-D62CF7F64DFE}"/>
+              </a:ext>
+            </a:extLst>
+          </p:cNvPr>
+          <p:cNvGrpSpPr/>
+          <p:nvPr/>
+        </p:nvGrpSpPr>
+        <p:grpSpPr>
+          <a:xfrm>
+            <a:off x="5389047" y="3722077"/>
+            <a:ext cx="1413906" cy="2398334"/>
+            <a:chOff x="3357046" y="1143404"/>
+            <a:chExt cx="1413906" cy="1397494"/>
+          </a:xfrm>
+        </p:grpSpPr>
+        <p:sp>
+          <p:nvSpPr>
+            <p:cNvPr id="16" name="Rectangle : avec coins arrondis en haut 15">
+              <a:extLst>
+                <a:ext uri="{FF2B5EF4-FFF2-40B4-BE49-F238E27FC236}">
+                  <a16:creationId xmlns:a16="http://schemas.microsoft.com/office/drawing/2014/main" id="{5D060B50-AAB9-3CED-E8D8-68239EFE1E02}"/>
+                </a:ext>
+              </a:extLst>
+            </p:cNvPr>
+            <p:cNvSpPr/>
+            <p:nvPr/>
+          </p:nvSpPr>
+          <p:spPr>
+            <a:xfrm rot="10800000">
+              <a:off x="3357046" y="1143404"/>
+              <a:ext cx="1413906" cy="1397494"/>
+            </a:xfrm>
+            <a:prstGeom prst="round2SameRect">
+              <a:avLst>
+                <a:gd name="adj1" fmla="val 10500"/>
+                <a:gd name="adj2" fmla="val 0"/>
+              </a:avLst>
+            </a:prstGeom>
+          </p:spPr>
+          <p:style>
+            <a:lnRef idx="2">
+              <a:schemeClr val="lt1">
+                <a:hueOff val="0"/>
+                <a:satOff val="0"/>
+                <a:lumOff val="0"/>
+                <a:alphaOff val="0"/>
+              </a:schemeClr>
+            </a:lnRef>
+            <a:fillRef idx="1">
+              <a:schemeClr val="accent2">
+                <a:hueOff val="-1279471"/>
+                <a:satOff val="-14424"/>
+                <a:lumOff val="1766"/>
+                <a:alphaOff val="0"/>
+              </a:schemeClr>
+            </a:fillRef>
+            <a:effectRef idx="0">
+              <a:schemeClr val="accent2">
+                <a:hueOff val="-1279471"/>
+                <a:satOff val="-14424"/>
+                <a:lumOff val="1766"/>
+                <a:alphaOff val="0"/>
+              </a:schemeClr>
+            </a:effectRef>
+            <a:fontRef idx="minor">
+              <a:schemeClr val="lt1"/>
+            </a:fontRef>
+          </p:style>
+        </p:sp>
+        <p:sp>
+          <p:nvSpPr>
+            <p:cNvPr id="17" name="Rectangle : avec coins arrondis en haut 4">
+              <a:extLst>
+                <a:ext uri="{FF2B5EF4-FFF2-40B4-BE49-F238E27FC236}">
+                  <a16:creationId xmlns:a16="http://schemas.microsoft.com/office/drawing/2014/main" id="{BA6331F9-B063-FFD2-EAD3-C059C9FB1CB1}"/>
+                </a:ext>
+              </a:extLst>
+            </p:cNvPr>
+            <p:cNvSpPr txBox="1"/>
+            <p:nvPr/>
+          </p:nvSpPr>
+          <p:spPr>
+            <a:xfrm rot="21600000">
+              <a:off x="3400024" y="1143404"/>
+              <a:ext cx="1327950" cy="1354516"/>
+            </a:xfrm>
+            <a:prstGeom prst="rect">
+              <a:avLst/>
+            </a:prstGeom>
+          </p:spPr>
+          <p:style>
+            <a:lnRef idx="0">
+              <a:scrgbClr r="0" g="0" b="0"/>
+            </a:lnRef>
+            <a:fillRef idx="0">
+              <a:scrgbClr r="0" g="0" b="0"/>
+            </a:fillRef>
+            <a:effectRef idx="0">
+              <a:scrgbClr r="0" g="0" b="0"/>
+            </a:effectRef>
+            <a:fontRef idx="minor">
+              <a:schemeClr val="lt1"/>
+            </a:fontRef>
+          </p:style>
+          <p:txBody>
+            <a:bodyPr spcFirstLastPara="0" vert="horz" wrap="square" lIns="135128" tIns="135128" rIns="135128" bIns="135128" numCol="1" spcCol="1270" anchor="t" anchorCtr="0">
+              <a:noAutofit/>
+            </a:bodyPr>
+            <a:lstStyle/>
+            <a:p>
+              <a:pPr marL="0" lvl="0" indent="0" algn="ctr" defTabSz="844550">
+                <a:lnSpc>
+                  <a:spcPct val="90000"/>
+                </a:lnSpc>
+                <a:spcBef>
+                  <a:spcPct val="0"/>
+                </a:spcBef>
+                <a:spcAft>
+                  <a:spcPct val="35000"/>
+                </a:spcAft>
+                <a:buNone/>
+              </a:pPr>
+              <a:endParaRPr lang="fr-FR" sz="1900" kern="1200" dirty="0"/>
+            </a:p>
+            <a:p>
+              <a:pPr marL="0" lvl="0" indent="0" algn="ctr" defTabSz="844550">
+                <a:lnSpc>
+                  <a:spcPct val="90000"/>
+                </a:lnSpc>
+                <a:spcBef>
+                  <a:spcPct val="0"/>
+                </a:spcBef>
+                <a:spcAft>
+                  <a:spcPct val="35000"/>
+                </a:spcAft>
+                <a:buNone/>
+              </a:pPr>
+              <a:endParaRPr lang="fr-FR" sz="1900" dirty="0"/>
+            </a:p>
+            <a:p>
+              <a:pPr marL="0" lvl="0" indent="0" algn="ctr" defTabSz="844550">
+                <a:lnSpc>
+                  <a:spcPct val="90000"/>
+                </a:lnSpc>
+                <a:spcBef>
+                  <a:spcPct val="0"/>
+                </a:spcBef>
+                <a:spcAft>
+                  <a:spcPct val="35000"/>
+                </a:spcAft>
+                <a:buNone/>
+              </a:pPr>
+              <a:endParaRPr lang="fr-FR" sz="1900" kern="1200" dirty="0"/>
+            </a:p>
+            <a:p>
+              <a:pPr marL="0" lvl="0" indent="0" algn="ctr" defTabSz="844550">
+                <a:lnSpc>
+                  <a:spcPct val="90000"/>
+                </a:lnSpc>
+                <a:spcBef>
+                  <a:spcPct val="0"/>
+                </a:spcBef>
+                <a:spcAft>
+                  <a:spcPct val="35000"/>
+                </a:spcAft>
+                <a:buNone/>
+              </a:pPr>
+              <a:r>
+                <a:rPr lang="fr-FR" sz="1900" kern="1200" dirty="0" err="1"/>
+                <a:t>Souhila</a:t>
+              </a:r>
+              <a:r>
+                <a:rPr lang="fr-FR" sz="1900" kern="1200" dirty="0"/>
+                <a:t> HAMADI</a:t>
+              </a:r>
+            </a:p>
+          </p:txBody>
+        </p:sp>
+      </p:grpSp>
+      <p:grpSp>
+        <p:nvGrpSpPr>
+          <p:cNvPr id="18" name="Groupe 17">
+            <a:extLst>
+              <a:ext uri="{FF2B5EF4-FFF2-40B4-BE49-F238E27FC236}">
+                <a16:creationId xmlns:a16="http://schemas.microsoft.com/office/drawing/2014/main" id="{838D9C8F-1E78-5AFF-EE0C-7E549E36AB33}"/>
+              </a:ext>
+            </a:extLst>
+          </p:cNvPr>
+          <p:cNvGrpSpPr/>
+          <p:nvPr/>
+        </p:nvGrpSpPr>
+        <p:grpSpPr>
+          <a:xfrm>
+            <a:off x="6934625" y="3722076"/>
+            <a:ext cx="1413906" cy="2398335"/>
+            <a:chOff x="4912344" y="1143404"/>
+            <a:chExt cx="1413906" cy="1397494"/>
+          </a:xfrm>
+        </p:grpSpPr>
+        <p:sp>
+          <p:nvSpPr>
+            <p:cNvPr id="19" name="Rectangle : avec coins arrondis en haut 18">
+              <a:extLst>
+                <a:ext uri="{FF2B5EF4-FFF2-40B4-BE49-F238E27FC236}">
+                  <a16:creationId xmlns:a16="http://schemas.microsoft.com/office/drawing/2014/main" id="{FB8F0782-2D52-247F-7FB9-2EE279DAB720}"/>
+                </a:ext>
+              </a:extLst>
+            </p:cNvPr>
+            <p:cNvSpPr/>
+            <p:nvPr/>
+          </p:nvSpPr>
+          <p:spPr>
+            <a:xfrm rot="10800000">
+              <a:off x="4912344" y="1143404"/>
+              <a:ext cx="1413906" cy="1397494"/>
+            </a:xfrm>
+            <a:prstGeom prst="round2SameRect">
+              <a:avLst>
+                <a:gd name="adj1" fmla="val 10500"/>
+                <a:gd name="adj2" fmla="val 0"/>
+              </a:avLst>
+            </a:prstGeom>
+          </p:spPr>
+          <p:style>
+            <a:lnRef idx="2">
+              <a:schemeClr val="lt1">
+                <a:hueOff val="0"/>
+                <a:satOff val="0"/>
+                <a:lumOff val="0"/>
+                <a:alphaOff val="0"/>
+              </a:schemeClr>
+            </a:lnRef>
+            <a:fillRef idx="1">
+              <a:schemeClr val="accent2">
+                <a:hueOff val="-1919206"/>
+                <a:satOff val="-21636"/>
+                <a:lumOff val="2650"/>
+                <a:alphaOff val="0"/>
+              </a:schemeClr>
+            </a:fillRef>
+            <a:effectRef idx="0">
+              <a:schemeClr val="accent2">
+                <a:hueOff val="-1919206"/>
+                <a:satOff val="-21636"/>
+                <a:lumOff val="2650"/>
+                <a:alphaOff val="0"/>
+              </a:schemeClr>
+            </a:effectRef>
+            <a:fontRef idx="minor">
+              <a:schemeClr val="lt1"/>
+            </a:fontRef>
+          </p:style>
+        </p:sp>
+        <p:sp>
+          <p:nvSpPr>
+            <p:cNvPr id="20" name="Rectangle : avec coins arrondis en haut 4">
+              <a:extLst>
+                <a:ext uri="{FF2B5EF4-FFF2-40B4-BE49-F238E27FC236}">
+                  <a16:creationId xmlns:a16="http://schemas.microsoft.com/office/drawing/2014/main" id="{D90BA4C2-17E2-9D02-C161-F5110771EE29}"/>
+                </a:ext>
+              </a:extLst>
+            </p:cNvPr>
+            <p:cNvSpPr txBox="1"/>
+            <p:nvPr/>
+          </p:nvSpPr>
+          <p:spPr>
+            <a:xfrm rot="21600000">
+              <a:off x="4955322" y="1143404"/>
+              <a:ext cx="1327950" cy="1354516"/>
+            </a:xfrm>
+            <a:prstGeom prst="rect">
+              <a:avLst/>
+            </a:prstGeom>
+          </p:spPr>
+          <p:style>
+            <a:lnRef idx="0">
+              <a:scrgbClr r="0" g="0" b="0"/>
+            </a:lnRef>
+            <a:fillRef idx="0">
+              <a:scrgbClr r="0" g="0" b="0"/>
+            </a:fillRef>
+            <a:effectRef idx="0">
+              <a:scrgbClr r="0" g="0" b="0"/>
+            </a:effectRef>
+            <a:fontRef idx="minor">
+              <a:schemeClr val="lt1"/>
+            </a:fontRef>
+          </p:style>
+          <p:txBody>
+            <a:bodyPr spcFirstLastPara="0" vert="horz" wrap="square" lIns="135128" tIns="135128" rIns="135128" bIns="135128" numCol="1" spcCol="1270" anchor="t" anchorCtr="0">
+              <a:noAutofit/>
+            </a:bodyPr>
+            <a:lstStyle/>
+            <a:p>
+              <a:pPr marL="0" lvl="0" indent="0" algn="ctr" defTabSz="844550">
+                <a:lnSpc>
+                  <a:spcPct val="90000"/>
+                </a:lnSpc>
+                <a:spcBef>
+                  <a:spcPct val="0"/>
+                </a:spcBef>
+                <a:spcAft>
+                  <a:spcPct val="35000"/>
+                </a:spcAft>
+                <a:buNone/>
+              </a:pPr>
+              <a:endParaRPr lang="fr-FR" sz="1900" kern="1200" dirty="0"/>
+            </a:p>
+            <a:p>
+              <a:pPr marL="0" lvl="0" indent="0" algn="ctr" defTabSz="844550">
+                <a:lnSpc>
+                  <a:spcPct val="90000"/>
+                </a:lnSpc>
+                <a:spcBef>
+                  <a:spcPct val="0"/>
+                </a:spcBef>
+                <a:spcAft>
+                  <a:spcPct val="35000"/>
+                </a:spcAft>
+                <a:buNone/>
+              </a:pPr>
+              <a:endParaRPr lang="fr-FR" sz="1900" dirty="0"/>
+            </a:p>
+            <a:p>
+              <a:pPr marL="0" lvl="0" indent="0" algn="ctr" defTabSz="844550">
+                <a:lnSpc>
+                  <a:spcPct val="90000"/>
+                </a:lnSpc>
+                <a:spcBef>
+                  <a:spcPct val="0"/>
+                </a:spcBef>
+                <a:spcAft>
+                  <a:spcPct val="35000"/>
+                </a:spcAft>
+                <a:buNone/>
+              </a:pPr>
+              <a:endParaRPr lang="fr-FR" sz="1900" kern="1200" dirty="0"/>
+            </a:p>
+            <a:p>
+              <a:pPr marL="0" lvl="0" indent="0" algn="ctr" defTabSz="844550">
+                <a:lnSpc>
+                  <a:spcPct val="90000"/>
+                </a:lnSpc>
+                <a:spcBef>
+                  <a:spcPct val="0"/>
+                </a:spcBef>
+                <a:spcAft>
+                  <a:spcPct val="35000"/>
+                </a:spcAft>
+                <a:buNone/>
+              </a:pPr>
+              <a:r>
+                <a:rPr lang="fr-FR" sz="1900" kern="1200" dirty="0"/>
+                <a:t>Cyril SAURET</a:t>
+              </a:r>
+            </a:p>
+          </p:txBody>
+        </p:sp>
+      </p:grpSp>
+      <p:grpSp>
+        <p:nvGrpSpPr>
+          <p:cNvPr id="21" name="Groupe 20">
+            <a:extLst>
+              <a:ext uri="{FF2B5EF4-FFF2-40B4-BE49-F238E27FC236}">
+                <a16:creationId xmlns:a16="http://schemas.microsoft.com/office/drawing/2014/main" id="{0424AFC4-67D4-83FC-EB88-0CC747D4E456}"/>
+              </a:ext>
+            </a:extLst>
+          </p:cNvPr>
+          <p:cNvGrpSpPr/>
+          <p:nvPr/>
+        </p:nvGrpSpPr>
+        <p:grpSpPr>
+          <a:xfrm>
+            <a:off x="8480205" y="3722075"/>
+            <a:ext cx="1413906" cy="2398336"/>
+            <a:chOff x="6467641" y="1143404"/>
+            <a:chExt cx="1413906" cy="1397494"/>
+          </a:xfrm>
+        </p:grpSpPr>
+        <p:sp>
+          <p:nvSpPr>
+            <p:cNvPr id="22" name="Rectangle : avec coins arrondis en haut 21">
+              <a:extLst>
+                <a:ext uri="{FF2B5EF4-FFF2-40B4-BE49-F238E27FC236}">
+                  <a16:creationId xmlns:a16="http://schemas.microsoft.com/office/drawing/2014/main" id="{AA6267FE-F527-DC1D-E88A-B30EB9FCAACA}"/>
+                </a:ext>
+              </a:extLst>
+            </p:cNvPr>
+            <p:cNvSpPr/>
+            <p:nvPr/>
+          </p:nvSpPr>
+          <p:spPr>
+            <a:xfrm rot="10800000">
+              <a:off x="6467641" y="1143404"/>
+              <a:ext cx="1413906" cy="1397494"/>
+            </a:xfrm>
+            <a:prstGeom prst="round2SameRect">
+              <a:avLst>
+                <a:gd name="adj1" fmla="val 10500"/>
+                <a:gd name="adj2" fmla="val 0"/>
+              </a:avLst>
+            </a:prstGeom>
+          </p:spPr>
+          <p:style>
+            <a:lnRef idx="2">
+              <a:schemeClr val="lt1">
+                <a:hueOff val="0"/>
+                <a:satOff val="0"/>
+                <a:lumOff val="0"/>
+                <a:alphaOff val="0"/>
+              </a:schemeClr>
+            </a:lnRef>
+            <a:fillRef idx="1">
+              <a:schemeClr val="accent2">
+                <a:hueOff val="-2558941"/>
+                <a:satOff val="-28848"/>
+                <a:lumOff val="3533"/>
+                <a:alphaOff val="0"/>
+              </a:schemeClr>
+            </a:fillRef>
+            <a:effectRef idx="0">
+              <a:schemeClr val="accent2">
+                <a:hueOff val="-2558941"/>
+                <a:satOff val="-28848"/>
+                <a:lumOff val="3533"/>
+                <a:alphaOff val="0"/>
+              </a:schemeClr>
+            </a:effectRef>
+            <a:fontRef idx="minor">
+              <a:schemeClr val="lt1"/>
+            </a:fontRef>
+          </p:style>
+        </p:sp>
+        <p:sp>
+          <p:nvSpPr>
+            <p:cNvPr id="23" name="Rectangle : avec coins arrondis en haut 4">
+              <a:extLst>
+                <a:ext uri="{FF2B5EF4-FFF2-40B4-BE49-F238E27FC236}">
+                  <a16:creationId xmlns:a16="http://schemas.microsoft.com/office/drawing/2014/main" id="{B2A13838-7C3B-6CA3-6A4E-E20702CF0127}"/>
+                </a:ext>
+              </a:extLst>
+            </p:cNvPr>
+            <p:cNvSpPr txBox="1"/>
+            <p:nvPr/>
+          </p:nvSpPr>
+          <p:spPr>
+            <a:xfrm rot="21600000">
+              <a:off x="6510619" y="1143404"/>
+              <a:ext cx="1327950" cy="1354516"/>
+            </a:xfrm>
+            <a:prstGeom prst="rect">
+              <a:avLst/>
+            </a:prstGeom>
+          </p:spPr>
+          <p:style>
+            <a:lnRef idx="0">
+              <a:scrgbClr r="0" g="0" b="0"/>
+            </a:lnRef>
+            <a:fillRef idx="0">
+              <a:scrgbClr r="0" g="0" b="0"/>
+            </a:fillRef>
+            <a:effectRef idx="0">
+              <a:scrgbClr r="0" g="0" b="0"/>
+            </a:effectRef>
+            <a:fontRef idx="minor">
+              <a:schemeClr val="lt1"/>
+            </a:fontRef>
+          </p:style>
+          <p:txBody>
+            <a:bodyPr spcFirstLastPara="0" vert="horz" wrap="square" lIns="135128" tIns="135128" rIns="135128" bIns="135128" numCol="1" spcCol="1270" anchor="t" anchorCtr="0">
+              <a:noAutofit/>
+            </a:bodyPr>
+            <a:lstStyle/>
+            <a:p>
+              <a:pPr marL="0" lvl="0" indent="0" algn="ctr" defTabSz="844550">
+                <a:lnSpc>
+                  <a:spcPct val="90000"/>
+                </a:lnSpc>
+                <a:spcBef>
+                  <a:spcPct val="0"/>
+                </a:spcBef>
+                <a:spcAft>
+                  <a:spcPct val="35000"/>
+                </a:spcAft>
+                <a:buNone/>
+              </a:pPr>
+              <a:endParaRPr lang="fr-FR" sz="1900" kern="1200" dirty="0"/>
+            </a:p>
+            <a:p>
+              <a:pPr marL="0" lvl="0" indent="0" algn="ctr" defTabSz="844550">
+                <a:lnSpc>
+                  <a:spcPct val="90000"/>
+                </a:lnSpc>
+                <a:spcBef>
+                  <a:spcPct val="0"/>
+                </a:spcBef>
+                <a:spcAft>
+                  <a:spcPct val="35000"/>
+                </a:spcAft>
+                <a:buNone/>
+              </a:pPr>
+              <a:endParaRPr lang="fr-FR" sz="1900" dirty="0"/>
+            </a:p>
+            <a:p>
+              <a:pPr marL="0" lvl="0" indent="0" algn="ctr" defTabSz="844550">
+                <a:lnSpc>
+                  <a:spcPct val="90000"/>
+                </a:lnSpc>
+                <a:spcBef>
+                  <a:spcPct val="0"/>
+                </a:spcBef>
+                <a:spcAft>
+                  <a:spcPct val="35000"/>
+                </a:spcAft>
+                <a:buNone/>
+              </a:pPr>
+              <a:endParaRPr lang="fr-FR" sz="1900" kern="1200" dirty="0"/>
+            </a:p>
+            <a:p>
+              <a:pPr marL="0" lvl="0" indent="0" algn="ctr" defTabSz="844550">
+                <a:lnSpc>
+                  <a:spcPct val="90000"/>
+                </a:lnSpc>
+                <a:spcBef>
+                  <a:spcPct val="0"/>
+                </a:spcBef>
+                <a:spcAft>
+                  <a:spcPct val="35000"/>
+                </a:spcAft>
+                <a:buNone/>
+              </a:pPr>
+              <a:r>
+                <a:rPr lang="fr-FR" sz="1900" kern="1200" dirty="0"/>
+                <a:t>Smaïl KHAMED</a:t>
+              </a:r>
+            </a:p>
+          </p:txBody>
+        </p:sp>
+      </p:grpSp>
+      <p:sp>
+        <p:nvSpPr>
+          <p:cNvPr id="24" name="Ellipse 23">
+            <a:extLst>
+              <a:ext uri="{FF2B5EF4-FFF2-40B4-BE49-F238E27FC236}">
+                <a16:creationId xmlns:a16="http://schemas.microsoft.com/office/drawing/2014/main" id="{69242582-B2AB-9429-831D-8636CD71405A}"/>
+              </a:ext>
+            </a:extLst>
+          </p:cNvPr>
+          <p:cNvSpPr>
+            <a:spLocks noChangeAspect="1"/>
+          </p:cNvSpPr>
+          <p:nvPr/>
+        </p:nvSpPr>
+        <p:spPr>
+          <a:xfrm>
+            <a:off x="2340867" y="3057877"/>
+            <a:ext cx="1328400" cy="1328400"/>
+          </a:xfrm>
+          <a:prstGeom prst="ellipse">
+            <a:avLst/>
+          </a:prstGeom>
+          <a:blipFill dpi="0" rotWithShape="1">
+            <a:blip r:embed="rId2">
+              <a:extLst>
+                <a:ext uri="{28A0092B-C50C-407E-A947-70E740481C1C}">
+                  <a14:useLocalDpi xmlns:a14="http://schemas.microsoft.com/office/drawing/2010/main" val="0"/>
+                </a:ext>
+              </a:extLst>
+            </a:blip>
+            <a:srcRect/>
+            <a:stretch>
+              <a:fillRect/>
+            </a:stretch>
+          </a:blipFill>
+          <a:ln w="38100">
+            <a:solidFill>
+              <a:schemeClr val="bg1"/>
+            </a:solidFill>
+          </a:ln>
+        </p:spPr>
+        <p:style>
+          <a:lnRef idx="2">
+            <a:schemeClr val="accent1">
+              <a:shade val="15000"/>
+            </a:schemeClr>
+          </a:lnRef>
+          <a:fillRef idx="1">
+            <a:schemeClr val="accent1"/>
+          </a:fillRef>
+          <a:effectRef idx="0">
+            <a:schemeClr val="accent1"/>
+          </a:effectRef>
+          <a:fontRef idx="minor">
+            <a:schemeClr val="lt1"/>
+          </a:fontRef>
+        </p:style>
+        <p:txBody>
+          <a:bodyPr rtlCol="0" anchor="ctr"/>
           <a:lstStyle/>
           <a:p>
+            <a:pPr algn="ctr"/>
+            <a:endParaRPr lang="fr-FR"/>
+          </a:p>
+        </p:txBody>
+      </p:sp>
+      <p:sp>
+        <p:nvSpPr>
+          <p:cNvPr id="27" name="Ellipse 26">
+            <a:extLst>
+              <a:ext uri="{FF2B5EF4-FFF2-40B4-BE49-F238E27FC236}">
+                <a16:creationId xmlns:a16="http://schemas.microsoft.com/office/drawing/2014/main" id="{DE497025-817D-2409-1DF0-EF615A468684}"/>
+              </a:ext>
+            </a:extLst>
+          </p:cNvPr>
+          <p:cNvSpPr>
+            <a:spLocks noChangeAspect="1"/>
+          </p:cNvSpPr>
+          <p:nvPr/>
+        </p:nvSpPr>
+        <p:spPr>
+          <a:xfrm>
+            <a:off x="3886220" y="3057877"/>
+            <a:ext cx="1328400" cy="1328400"/>
+          </a:xfrm>
+          <a:prstGeom prst="ellipse">
+            <a:avLst/>
+          </a:prstGeom>
+          <a:blipFill dpi="0" rotWithShape="1">
+            <a:blip r:embed="rId3">
+              <a:extLst>
+                <a:ext uri="{28A0092B-C50C-407E-A947-70E740481C1C}">
+                  <a14:useLocalDpi xmlns:a14="http://schemas.microsoft.com/office/drawing/2010/main" val="0"/>
+                </a:ext>
+              </a:extLst>
+            </a:blip>
+            <a:srcRect/>
+            <a:stretch>
+              <a:fillRect/>
+            </a:stretch>
+          </a:blipFill>
+          <a:ln w="38100">
+            <a:solidFill>
+              <a:schemeClr val="bg1"/>
+            </a:solidFill>
+          </a:ln>
+        </p:spPr>
+        <p:style>
+          <a:lnRef idx="2">
+            <a:schemeClr val="accent1">
+              <a:shade val="15000"/>
+            </a:schemeClr>
+          </a:lnRef>
+          <a:fillRef idx="1">
+            <a:schemeClr val="accent1"/>
+          </a:fillRef>
+          <a:effectRef idx="0">
+            <a:schemeClr val="accent1"/>
+          </a:effectRef>
+          <a:fontRef idx="minor">
+            <a:schemeClr val="lt1"/>
+          </a:fontRef>
+        </p:style>
+        <p:txBody>
+          <a:bodyPr rtlCol="0" anchor="ctr"/>
+          <a:lstStyle/>
+          <a:p>
+            <a:pPr algn="ctr"/>
+            <a:endParaRPr lang="fr-FR"/>
+          </a:p>
+        </p:txBody>
+      </p:sp>
+      <p:sp>
+        <p:nvSpPr>
+          <p:cNvPr id="28" name="Ellipse 27">
+            <a:extLst>
+              <a:ext uri="{FF2B5EF4-FFF2-40B4-BE49-F238E27FC236}">
+                <a16:creationId xmlns:a16="http://schemas.microsoft.com/office/drawing/2014/main" id="{1F80B087-74B3-318D-5BC6-D8374A1BBC88}"/>
+              </a:ext>
+            </a:extLst>
+          </p:cNvPr>
+          <p:cNvSpPr>
+            <a:spLocks noChangeAspect="1"/>
+          </p:cNvSpPr>
+          <p:nvPr/>
+        </p:nvSpPr>
+        <p:spPr>
+          <a:xfrm>
+            <a:off x="5431573" y="3057875"/>
+            <a:ext cx="1328400" cy="1328400"/>
+          </a:xfrm>
+          <a:prstGeom prst="ellipse">
+            <a:avLst/>
+          </a:prstGeom>
+          <a:blipFill dpi="0" rotWithShape="1">
+            <a:blip r:embed="rId4">
+              <a:extLst>
+                <a:ext uri="{28A0092B-C50C-407E-A947-70E740481C1C}">
+                  <a14:useLocalDpi xmlns:a14="http://schemas.microsoft.com/office/drawing/2010/main" val="0"/>
+                </a:ext>
+              </a:extLst>
+            </a:blip>
+            <a:srcRect/>
+            <a:stretch>
+              <a:fillRect/>
+            </a:stretch>
+          </a:blipFill>
+          <a:ln w="38100">
+            <a:solidFill>
+              <a:schemeClr val="bg1"/>
+            </a:solidFill>
+          </a:ln>
+        </p:spPr>
+        <p:style>
+          <a:lnRef idx="2">
+            <a:schemeClr val="accent1">
+              <a:shade val="15000"/>
+            </a:schemeClr>
+          </a:lnRef>
+          <a:fillRef idx="1">
+            <a:schemeClr val="accent1"/>
+          </a:fillRef>
+          <a:effectRef idx="0">
+            <a:schemeClr val="accent1"/>
+          </a:effectRef>
+          <a:fontRef idx="minor">
+            <a:schemeClr val="lt1"/>
+          </a:fontRef>
+        </p:style>
+        <p:txBody>
+          <a:bodyPr rtlCol="0" anchor="ctr"/>
+          <a:lstStyle/>
+          <a:p>
+            <a:pPr algn="ctr"/>
+            <a:endParaRPr lang="fr-FR"/>
+          </a:p>
+        </p:txBody>
+      </p:sp>
+      <p:sp>
+        <p:nvSpPr>
+          <p:cNvPr id="29" name="Ellipse 28">
+            <a:extLst>
+              <a:ext uri="{FF2B5EF4-FFF2-40B4-BE49-F238E27FC236}">
+                <a16:creationId xmlns:a16="http://schemas.microsoft.com/office/drawing/2014/main" id="{81999ABF-DAC2-59A8-B6A1-6F56169A6A97}"/>
+              </a:ext>
+            </a:extLst>
+          </p:cNvPr>
+          <p:cNvSpPr>
+            <a:spLocks noChangeAspect="1"/>
+          </p:cNvSpPr>
+          <p:nvPr/>
+        </p:nvSpPr>
+        <p:spPr>
+          <a:xfrm>
+            <a:off x="6977377" y="3057875"/>
+            <a:ext cx="1328400" cy="1328400"/>
+          </a:xfrm>
+          <a:prstGeom prst="ellipse">
+            <a:avLst/>
+          </a:prstGeom>
+          <a:blipFill dpi="0" rotWithShape="1">
+            <a:blip r:embed="rId5">
+              <a:extLst>
+                <a:ext uri="{28A0092B-C50C-407E-A947-70E740481C1C}">
+                  <a14:useLocalDpi xmlns:a14="http://schemas.microsoft.com/office/drawing/2010/main" val="0"/>
+                </a:ext>
+              </a:extLst>
+            </a:blip>
+            <a:srcRect/>
+            <a:stretch>
+              <a:fillRect/>
+            </a:stretch>
+          </a:blipFill>
+          <a:ln w="38100">
+            <a:solidFill>
+              <a:schemeClr val="bg1"/>
+            </a:solidFill>
+          </a:ln>
+        </p:spPr>
+        <p:style>
+          <a:lnRef idx="2">
+            <a:schemeClr val="accent1">
+              <a:shade val="15000"/>
+            </a:schemeClr>
+          </a:lnRef>
+          <a:fillRef idx="1">
+            <a:schemeClr val="accent1"/>
+          </a:fillRef>
+          <a:effectRef idx="0">
+            <a:schemeClr val="accent1"/>
+          </a:effectRef>
+          <a:fontRef idx="minor">
+            <a:schemeClr val="lt1"/>
+          </a:fontRef>
+        </p:style>
+        <p:txBody>
+          <a:bodyPr rtlCol="0" anchor="ctr"/>
+          <a:lstStyle/>
+          <a:p>
+            <a:pPr algn="ctr"/>
+            <a:endParaRPr lang="fr-FR"/>
+          </a:p>
+        </p:txBody>
+      </p:sp>
+      <p:sp>
+        <p:nvSpPr>
+          <p:cNvPr id="30" name="Ellipse 29">
+            <a:extLst>
+              <a:ext uri="{FF2B5EF4-FFF2-40B4-BE49-F238E27FC236}">
+                <a16:creationId xmlns:a16="http://schemas.microsoft.com/office/drawing/2014/main" id="{4ECBA03D-999F-5545-EBC7-32074A5293CC}"/>
+              </a:ext>
+            </a:extLst>
+          </p:cNvPr>
+          <p:cNvSpPr>
+            <a:spLocks noChangeAspect="1"/>
+          </p:cNvSpPr>
+          <p:nvPr/>
+        </p:nvSpPr>
+        <p:spPr>
+          <a:xfrm>
+            <a:off x="8522958" y="3057875"/>
+            <a:ext cx="1328400" cy="1328400"/>
+          </a:xfrm>
+          <a:prstGeom prst="ellipse">
+            <a:avLst/>
+          </a:prstGeom>
+          <a:blipFill dpi="0" rotWithShape="1">
+            <a:blip r:embed="rId6">
+              <a:extLst>
+                <a:ext uri="{28A0092B-C50C-407E-A947-70E740481C1C}">
+                  <a14:useLocalDpi xmlns:a14="http://schemas.microsoft.com/office/drawing/2010/main" val="0"/>
+                </a:ext>
+              </a:extLst>
+            </a:blip>
+            <a:srcRect/>
+            <a:stretch>
+              <a:fillRect/>
+            </a:stretch>
+          </a:blipFill>
+          <a:ln w="38100">
+            <a:solidFill>
+              <a:schemeClr val="bg1"/>
+            </a:solidFill>
+          </a:ln>
+        </p:spPr>
+        <p:style>
+          <a:lnRef idx="2">
+            <a:schemeClr val="accent1">
+              <a:shade val="15000"/>
+            </a:schemeClr>
+          </a:lnRef>
+          <a:fillRef idx="1">
+            <a:schemeClr val="accent1"/>
+          </a:fillRef>
+          <a:effectRef idx="0">
+            <a:schemeClr val="accent1"/>
+          </a:effectRef>
+          <a:fontRef idx="minor">
+            <a:schemeClr val="lt1"/>
+          </a:fontRef>
+        </p:style>
+        <p:txBody>
+          <a:bodyPr rtlCol="0" anchor="ctr"/>
+          <a:lstStyle/>
+          <a:p>
+            <a:pPr algn="ctr"/>
             <a:endParaRPr lang="fr-FR"/>
           </a:p>
         </p:txBody>
@@ -8470,19 +9693,22 @@
           <a:bodyPr/>
           <a:lstStyle/>
           <a:p>
+            <a:br>
+              <a:rPr lang="fr-FR" dirty="0"/>
+            </a:br>
             <a:r>
               <a:rPr lang="fr-FR" dirty="0"/>
-              <a:t>Cas de test sur Jira</a:t>
+              <a:t>Plan de la présentation</a:t>
             </a:r>
           </a:p>
         </p:txBody>
       </p:sp>
       <p:sp>
         <p:nvSpPr>
-          <p:cNvPr id="6" name="Espace réservé pour une image  5">
+          <p:cNvPr id="10" name="Espace réservé du contenu 9">
             <a:extLst>
               <a:ext uri="{FF2B5EF4-FFF2-40B4-BE49-F238E27FC236}">
-                <a16:creationId xmlns:a16="http://schemas.microsoft.com/office/drawing/2014/main" id="{D2EB48C3-E2F1-BC99-1BB4-E7590F0B833B}"/>
+                <a16:creationId xmlns:a16="http://schemas.microsoft.com/office/drawing/2014/main" id="{A29950CD-EF01-6109-1F47-F345B903FD27}"/>
               </a:ext>
             </a:extLst>
           </p:cNvPr>
@@ -8490,25 +9716,7 @@
             <a:spLocks noGrp="1"/>
           </p:cNvSpPr>
           <p:nvPr>
-            <p:ph type="pic" idx="1"/>
-          </p:nvPr>
-        </p:nvSpPr>
-        <p:spPr/>
-      </p:sp>
-      <p:sp>
-        <p:nvSpPr>
-          <p:cNvPr id="7" name="Espace réservé du texte 6">
-            <a:extLst>
-              <a:ext uri="{FF2B5EF4-FFF2-40B4-BE49-F238E27FC236}">
-                <a16:creationId xmlns:a16="http://schemas.microsoft.com/office/drawing/2014/main" id="{22A001D4-CCDF-D740-8EBD-C2EDB08FFCB8}"/>
-              </a:ext>
-            </a:extLst>
-          </p:cNvPr>
-          <p:cNvSpPr>
-            <a:spLocks noGrp="1"/>
-          </p:cNvSpPr>
-          <p:nvPr>
-            <p:ph type="body" sz="half" idx="2"/>
+            <p:ph idx="1"/>
           </p:nvPr>
         </p:nvSpPr>
         <p:spPr/>
@@ -8555,7 +9763,7 @@
           <p:cNvPr id="7" name="Titre 6">
             <a:extLst>
               <a:ext uri="{FF2B5EF4-FFF2-40B4-BE49-F238E27FC236}">
-                <a16:creationId xmlns:a16="http://schemas.microsoft.com/office/drawing/2014/main" id="{EF5AEFDA-66B6-8893-CD8F-3C95D3B76BC5}"/>
+                <a16:creationId xmlns:a16="http://schemas.microsoft.com/office/drawing/2014/main" id="{1941091D-312D-7317-F68B-AF8C3F53553B}"/>
               </a:ext>
             </a:extLst>
           </p:cNvPr>
@@ -8573,17 +9781,17 @@
           <a:p>
             <a:r>
               <a:rPr lang="fr-FR" dirty="0"/>
-              <a:t>Architecture client-serveur</a:t>
+              <a:t>Présentation du projet</a:t>
             </a:r>
           </a:p>
         </p:txBody>
       </p:sp>
       <p:sp>
         <p:nvSpPr>
-          <p:cNvPr id="8" name="Espace réservé pour une image  7">
+          <p:cNvPr id="8" name="Espace réservé du contenu 7">
             <a:extLst>
               <a:ext uri="{FF2B5EF4-FFF2-40B4-BE49-F238E27FC236}">
-                <a16:creationId xmlns:a16="http://schemas.microsoft.com/office/drawing/2014/main" id="{82194FA5-ECE1-7FC5-59C4-528C22215C8A}"/>
+                <a16:creationId xmlns:a16="http://schemas.microsoft.com/office/drawing/2014/main" id="{A64EF632-A367-E038-4276-57C75F34C2AF}"/>
               </a:ext>
             </a:extLst>
           </p:cNvPr>
@@ -8591,25 +9799,7 @@
             <a:spLocks noGrp="1"/>
           </p:cNvSpPr>
           <p:nvPr>
-            <p:ph type="pic" idx="1"/>
-          </p:nvPr>
-        </p:nvSpPr>
-        <p:spPr/>
-      </p:sp>
-      <p:sp>
-        <p:nvSpPr>
-          <p:cNvPr id="9" name="Espace réservé du texte 8">
-            <a:extLst>
-              <a:ext uri="{FF2B5EF4-FFF2-40B4-BE49-F238E27FC236}">
-                <a16:creationId xmlns:a16="http://schemas.microsoft.com/office/drawing/2014/main" id="{B3CE2EBE-F54F-A536-37B5-7E929F61B561}"/>
-              </a:ext>
-            </a:extLst>
-          </p:cNvPr>
-          <p:cNvSpPr>
-            <a:spLocks noGrp="1"/>
-          </p:cNvSpPr>
-          <p:nvPr>
-            <p:ph type="body" sz="half" idx="2"/>
+            <p:ph idx="1"/>
           </p:nvPr>
         </p:nvSpPr>
         <p:spPr/>
@@ -8624,7 +9814,7 @@
     </p:spTree>
     <p:extLst>
       <p:ext uri="{BB962C8B-B14F-4D97-AF65-F5344CB8AC3E}">
-        <p14:creationId xmlns:p14="http://schemas.microsoft.com/office/powerpoint/2010/main" val="1879328817"/>
+        <p14:creationId xmlns:p14="http://schemas.microsoft.com/office/powerpoint/2010/main" val="4010127904"/>
       </p:ext>
     </p:extLst>
   </p:cSld>
@@ -8665,8 +9855,8 @@
         </p:nvSpPr>
         <p:spPr>
           <a:xfrm>
-            <a:off x="7585269" y="2872693"/>
-            <a:ext cx="4064715" cy="3675241"/>
+            <a:off x="7800230" y="2478541"/>
+            <a:ext cx="3849754" cy="4069394"/>
           </a:xfrm>
           <a:prstGeom prst="roundRect">
             <a:avLst/>
@@ -8766,7 +9956,7 @@
         </p:blipFill>
         <p:spPr>
           <a:xfrm>
-            <a:off x="8605164" y="922747"/>
+            <a:off x="8605164" y="453617"/>
             <a:ext cx="2024923" cy="2024923"/>
           </a:xfrm>
           <a:prstGeom prst="rect">
@@ -8888,7 +10078,7 @@
         </p:nvSpPr>
         <p:spPr>
           <a:xfrm>
-            <a:off x="8253976" y="674909"/>
+            <a:off x="8253976" y="205779"/>
             <a:ext cx="2727297" cy="369332"/>
           </a:xfrm>
           <a:prstGeom prst="rect">
@@ -9102,8 +10292,8 @@
         </p:nvSpPr>
         <p:spPr>
           <a:xfrm rot="10800000" flipV="1">
-            <a:off x="2671638" y="5667660"/>
-            <a:ext cx="4817275" cy="524786"/>
+            <a:off x="2798858" y="5667660"/>
+            <a:ext cx="4690054" cy="524786"/>
           </a:xfrm>
           <a:prstGeom prst="bentUpArrow">
             <a:avLst>
@@ -9183,7 +10373,7 @@
             </a:r>
             <a:r>
               <a:rPr lang="fr-FR" sz="1400" b="1" dirty="0"/>
-              <a:t>ex : « Je voudrais créer un compte utilisateur avec ces informations (…) »</a:t>
+              <a:t>ex : « Je veux créer un compte utilisateur avec ces informations (…) »</a:t>
             </a:r>
           </a:p>
         </p:txBody>
@@ -9239,6 +10429,205 @@
     <p:extLst>
       <p:ext uri="{BB962C8B-B14F-4D97-AF65-F5344CB8AC3E}">
         <p14:creationId xmlns:p14="http://schemas.microsoft.com/office/powerpoint/2010/main" val="138361339"/>
+      </p:ext>
+    </p:extLst>
+  </p:cSld>
+  <p:clrMapOvr>
+    <a:masterClrMapping/>
+  </p:clrMapOvr>
+</p:sld>
+</file>
+
+<file path=ppt/slides/slide6.xml><?xml version="1.0" encoding="utf-8"?>
+<p:sld xmlns:a="http://schemas.openxmlformats.org/drawingml/2006/main" xmlns:r="http://schemas.openxmlformats.org/officeDocument/2006/relationships" xmlns:p="http://schemas.openxmlformats.org/presentationml/2006/main">
+  <p:cSld>
+    <p:spTree>
+      <p:nvGrpSpPr>
+        <p:cNvPr id="1" name=""/>
+        <p:cNvGrpSpPr/>
+        <p:nvPr/>
+      </p:nvGrpSpPr>
+      <p:grpSpPr>
+        <a:xfrm>
+          <a:off x="0" y="0"/>
+          <a:ext cx="0" cy="0"/>
+          <a:chOff x="0" y="0"/>
+          <a:chExt cx="0" cy="0"/>
+        </a:xfrm>
+      </p:grpSpPr>
+      <p:sp>
+        <p:nvSpPr>
+          <p:cNvPr id="2" name="Titre 1">
+            <a:extLst>
+              <a:ext uri="{FF2B5EF4-FFF2-40B4-BE49-F238E27FC236}">
+                <a16:creationId xmlns:a16="http://schemas.microsoft.com/office/drawing/2014/main" id="{D8280934-AA0F-FF26-290C-542D8B8A122C}"/>
+              </a:ext>
+            </a:extLst>
+          </p:cNvPr>
+          <p:cNvSpPr>
+            <a:spLocks noGrp="1"/>
+          </p:cNvSpPr>
+          <p:nvPr>
+            <p:ph type="title"/>
+          </p:nvPr>
+        </p:nvSpPr>
+        <p:spPr/>
+        <p:txBody>
+          <a:bodyPr/>
+          <a:lstStyle/>
+          <a:p>
+            <a:endParaRPr lang="fr-FR"/>
+          </a:p>
+        </p:txBody>
+      </p:sp>
+      <p:sp>
+        <p:nvSpPr>
+          <p:cNvPr id="3" name="Espace réservé pour une image  2">
+            <a:extLst>
+              <a:ext uri="{FF2B5EF4-FFF2-40B4-BE49-F238E27FC236}">
+                <a16:creationId xmlns:a16="http://schemas.microsoft.com/office/drawing/2014/main" id="{2E61AFFC-2206-6C8E-50F7-79D8D418FF16}"/>
+              </a:ext>
+            </a:extLst>
+          </p:cNvPr>
+          <p:cNvSpPr>
+            <a:spLocks noGrp="1"/>
+          </p:cNvSpPr>
+          <p:nvPr>
+            <p:ph type="pic" idx="1"/>
+          </p:nvPr>
+        </p:nvSpPr>
+        <p:spPr/>
+      </p:sp>
+      <p:sp>
+        <p:nvSpPr>
+          <p:cNvPr id="4" name="Espace réservé du texte 3">
+            <a:extLst>
+              <a:ext uri="{FF2B5EF4-FFF2-40B4-BE49-F238E27FC236}">
+                <a16:creationId xmlns:a16="http://schemas.microsoft.com/office/drawing/2014/main" id="{2EA3479D-06AD-25C0-D1AB-0318173CF56C}"/>
+              </a:ext>
+            </a:extLst>
+          </p:cNvPr>
+          <p:cNvSpPr>
+            <a:spLocks noGrp="1"/>
+          </p:cNvSpPr>
+          <p:nvPr>
+            <p:ph type="body" sz="half" idx="2"/>
+          </p:nvPr>
+        </p:nvSpPr>
+        <p:spPr/>
+        <p:txBody>
+          <a:bodyPr/>
+          <a:lstStyle/>
+          <a:p>
+            <a:endParaRPr lang="fr-FR"/>
+          </a:p>
+        </p:txBody>
+      </p:sp>
+    </p:spTree>
+    <p:extLst>
+      <p:ext uri="{BB962C8B-B14F-4D97-AF65-F5344CB8AC3E}">
+        <p14:creationId xmlns:p14="http://schemas.microsoft.com/office/powerpoint/2010/main" val="1633891866"/>
+      </p:ext>
+    </p:extLst>
+  </p:cSld>
+  <p:clrMapOvr>
+    <a:masterClrMapping/>
+  </p:clrMapOvr>
+</p:sld>
+</file>
+
+<file path=ppt/slides/slide7.xml><?xml version="1.0" encoding="utf-8"?>
+<p:sld xmlns:a="http://schemas.openxmlformats.org/drawingml/2006/main" xmlns:r="http://schemas.openxmlformats.org/officeDocument/2006/relationships" xmlns:p="http://schemas.openxmlformats.org/presentationml/2006/main">
+  <p:cSld>
+    <p:spTree>
+      <p:nvGrpSpPr>
+        <p:cNvPr id="1" name=""/>
+        <p:cNvGrpSpPr/>
+        <p:nvPr/>
+      </p:nvGrpSpPr>
+      <p:grpSpPr>
+        <a:xfrm>
+          <a:off x="0" y="0"/>
+          <a:ext cx="0" cy="0"/>
+          <a:chOff x="0" y="0"/>
+          <a:chExt cx="0" cy="0"/>
+        </a:xfrm>
+      </p:grpSpPr>
+      <p:sp>
+        <p:nvSpPr>
+          <p:cNvPr id="7" name="Titre 6">
+            <a:extLst>
+              <a:ext uri="{FF2B5EF4-FFF2-40B4-BE49-F238E27FC236}">
+                <a16:creationId xmlns:a16="http://schemas.microsoft.com/office/drawing/2014/main" id="{EF5AEFDA-66B6-8893-CD8F-3C95D3B76BC5}"/>
+              </a:ext>
+            </a:extLst>
+          </p:cNvPr>
+          <p:cNvSpPr>
+            <a:spLocks noGrp="1"/>
+          </p:cNvSpPr>
+          <p:nvPr>
+            <p:ph type="title"/>
+          </p:nvPr>
+        </p:nvSpPr>
+        <p:spPr/>
+        <p:txBody>
+          <a:bodyPr/>
+          <a:lstStyle/>
+          <a:p>
+            <a:r>
+              <a:rPr lang="fr-FR" dirty="0"/>
+              <a:t>Architecture client-serveur</a:t>
+            </a:r>
+          </a:p>
+        </p:txBody>
+      </p:sp>
+      <p:sp>
+        <p:nvSpPr>
+          <p:cNvPr id="8" name="Espace réservé pour une image  7">
+            <a:extLst>
+              <a:ext uri="{FF2B5EF4-FFF2-40B4-BE49-F238E27FC236}">
+                <a16:creationId xmlns:a16="http://schemas.microsoft.com/office/drawing/2014/main" id="{82194FA5-ECE1-7FC5-59C4-528C22215C8A}"/>
+              </a:ext>
+            </a:extLst>
+          </p:cNvPr>
+          <p:cNvSpPr>
+            <a:spLocks noGrp="1"/>
+          </p:cNvSpPr>
+          <p:nvPr>
+            <p:ph type="pic" idx="1"/>
+          </p:nvPr>
+        </p:nvSpPr>
+        <p:spPr/>
+      </p:sp>
+      <p:sp>
+        <p:nvSpPr>
+          <p:cNvPr id="9" name="Espace réservé du texte 8">
+            <a:extLst>
+              <a:ext uri="{FF2B5EF4-FFF2-40B4-BE49-F238E27FC236}">
+                <a16:creationId xmlns:a16="http://schemas.microsoft.com/office/drawing/2014/main" id="{B3CE2EBE-F54F-A536-37B5-7E929F61B561}"/>
+              </a:ext>
+            </a:extLst>
+          </p:cNvPr>
+          <p:cNvSpPr>
+            <a:spLocks noGrp="1"/>
+          </p:cNvSpPr>
+          <p:nvPr>
+            <p:ph type="body" sz="half" idx="2"/>
+          </p:nvPr>
+        </p:nvSpPr>
+        <p:spPr/>
+        <p:txBody>
+          <a:bodyPr/>
+          <a:lstStyle/>
+          <a:p>
+            <a:endParaRPr lang="fr-FR" dirty="0"/>
+          </a:p>
+        </p:txBody>
+      </p:sp>
+    </p:spTree>
+    <p:extLst>
+      <p:ext uri="{BB962C8B-B14F-4D97-AF65-F5344CB8AC3E}">
+        <p14:creationId xmlns:p14="http://schemas.microsoft.com/office/powerpoint/2010/main" val="1879328817"/>
       </p:ext>
     </p:extLst>
   </p:cSld>

</xml_diff>

<commit_message>
Add : update demo-day presentation
</commit_message>
<xml_diff>
--- a/presentation/presentation.pptx
+++ b/presentation/presentation.pptx
@@ -35575,9 +35575,18 @@
                     <a:buNone/>
                   </a:pPr>
                   <a:r>
-                    <a:rPr lang="fr-FR" sz="1900" kern="1200" dirty="0"/>
-                    <a:t>Alicia LACÔTE</a:t>
+                    <a:rPr lang="fr-FR" sz="1900" kern="1200"/>
+                    <a:t>Alicia LAC</a:t>
                   </a:r>
+                  <a:r>
+                    <a:rPr lang="fr-FR" sz="1900"/>
+                    <a:t>O</a:t>
+                  </a:r>
+                  <a:r>
+                    <a:rPr lang="fr-FR" sz="1900" kern="1200"/>
+                    <a:t>TE</a:t>
+                  </a:r>
+                  <a:endParaRPr lang="fr-FR" sz="1900" kern="1200" dirty="0"/>
                 </a:p>
               </p:txBody>
             </p:sp>

</xml_diff>